<commit_message>
Actualización de base de datos
</commit_message>
<xml_diff>
--- a/Programacion_3_Evaluacion/ConexionSql/BaseDeDatos.pptx
+++ b/Programacion_3_Evaluacion/ConexionSql/BaseDeDatos.pptx
@@ -3629,7 +3629,7 @@
       </p:sp>
       <p:pic>
         <p:nvPicPr>
-          <p:cNvPr id="6" name="Picture 2" descr="Conectando una BBDD con JDBC y MySql - Java desde 0"/>
+          <p:cNvPr id="1026" name="Picture 2" descr="PostgreSQL JDBC Tutorial: Interact with Postgres From Java"/>
           <p:cNvPicPr>
             <a:picLocks noChangeAspect="1" noChangeArrowheads="1"/>
           </p:cNvPicPr>
@@ -3650,8 +3650,8 @@
         </p:blipFill>
         <p:spPr bwMode="auto">
           <a:xfrm>
-            <a:off x="2779449" y="2200301"/>
-            <a:ext cx="6172798" cy="3067050"/>
+            <a:off x="2277505" y="2027236"/>
+            <a:ext cx="6927455" cy="3337244"/>
           </a:xfrm>
           <a:prstGeom prst="rect">
             <a:avLst/>
@@ -4309,15 +4309,7 @@
             </a:r>
             <a:r>
               <a:rPr lang="es-ES" sz="1100" b="1" dirty="0"/>
-              <a:t>clase "Ventana" contiene un </a:t>
-            </a:r>
-            <a:r>
-              <a:rPr lang="es-ES" sz="1100" b="1" dirty="0" err="1"/>
-              <a:t>ArrayList</a:t>
-            </a:r>
-            <a:r>
-              <a:rPr lang="es-ES" sz="1100" b="1" dirty="0"/>
-              <a:t> de empleados, un objeto de repositorio de empleados y un objeto de empleado </a:t>
+              <a:t>clase "Ventana" contiene un ArrayList de empleados, un objeto de repositorio de empleados y un objeto de empleado </a:t>
             </a:r>
             <a:r>
               <a:rPr lang="es-ES" sz="1100" b="1" dirty="0" smtClean="0"/>
@@ -4373,15 +4365,7 @@
             </a:r>
             <a:r>
               <a:rPr lang="es-ES" sz="1100" b="1" dirty="0"/>
-              <a:t>métodos para cargar, actualizar y eliminar información de empleados en el </a:t>
-            </a:r>
-            <a:r>
-              <a:rPr lang="es-ES" sz="1100" b="1" dirty="0" err="1"/>
-              <a:t>ArrayList</a:t>
-            </a:r>
-            <a:r>
-              <a:rPr lang="es-ES" sz="1100" b="1" dirty="0"/>
-              <a:t> y en la tabla. El método "cargar" toma una lista de empleados y la carga en la </a:t>
+              <a:t>métodos para cargar, actualizar y eliminar información de empleados en el ArrayList y en la tabla. El método "cargar" toma una lista de empleados y la carga en la </a:t>
             </a:r>
             <a:r>
               <a:rPr lang="es-ES" sz="1100" b="1" dirty="0" smtClean="0"/>
@@ -4992,12 +4976,8 @@
           <a:lstStyle/>
           <a:p>
             <a:r>
-              <a:rPr lang="es-ES" sz="1200" b="1" dirty="0" err="1" smtClean="0"/>
-              <a:t>Contieneun</a:t>
-            </a:r>
-            <a:r>
               <a:rPr lang="es-ES" sz="1200" b="1" dirty="0" smtClean="0"/>
-              <a:t> </a:t>
+              <a:t>Contienen </a:t>
             </a:r>
             <a:r>
               <a:rPr lang="es-ES" sz="1200" b="1" dirty="0"/>
@@ -5329,21 +5309,22 @@
       </p:sp>
       <p:pic>
         <p:nvPicPr>
-          <p:cNvPr id="4" name="Imagen 3"/>
+          <p:cNvPr id="2" name="Imagen 1"/>
           <p:cNvPicPr>
             <a:picLocks noChangeAspect="1"/>
           </p:cNvPicPr>
           <p:nvPr/>
         </p:nvPicPr>
-        <p:blipFill rotWithShape="1">
+        <p:blipFill>
           <a:blip r:embed="rId2"/>
-          <a:srcRect r="9323" b="15547"/>
-          <a:stretch/>
+          <a:stretch>
+            <a:fillRect/>
+          </a:stretch>
         </p:blipFill>
         <p:spPr>
           <a:xfrm>
-            <a:off x="5018444" y="1438031"/>
-            <a:ext cx="4944706" cy="3012049"/>
+            <a:off x="5106074" y="1225185"/>
+            <a:ext cx="5586707" cy="3687895"/>
           </a:xfrm>
           <a:prstGeom prst="rect">
             <a:avLst/>
@@ -5358,7 +5339,7 @@
         </p:nvSpPr>
         <p:spPr>
           <a:xfrm>
-            <a:off x="628886" y="3792974"/>
+            <a:off x="382743" y="4481880"/>
             <a:ext cx="4822987" cy="369332"/>
           </a:xfrm>
           <a:prstGeom prst="rect">
@@ -5375,6 +5356,89 @@
               <a:rPr lang="es-ES" dirty="0"/>
               <a:t>https://github.com/WindaLobo/Programacion.git</a:t>
             </a:r>
+          </a:p>
+        </p:txBody>
+      </p:sp>
+      <p:sp>
+        <p:nvSpPr>
+          <p:cNvPr id="10" name="Flecha derecha 9"/>
+          <p:cNvSpPr/>
+          <p:nvPr/>
+        </p:nvSpPr>
+        <p:spPr>
+          <a:xfrm rot="19893373" flipV="1">
+            <a:off x="4876457" y="3869118"/>
+            <a:ext cx="1944391" cy="71201"/>
+          </a:xfrm>
+          <a:prstGeom prst="rightArrow">
+            <a:avLst/>
+          </a:prstGeom>
+          <a:solidFill>
+            <a:srgbClr val="FF0000"/>
+          </a:solidFill>
+          <a:ln>
+            <a:solidFill>
+              <a:srgbClr val="FF0000"/>
+            </a:solidFill>
+          </a:ln>
+        </p:spPr>
+        <p:style>
+          <a:lnRef idx="2">
+            <a:schemeClr val="accent1">
+              <a:shade val="50000"/>
+            </a:schemeClr>
+          </a:lnRef>
+          <a:fillRef idx="1">
+            <a:schemeClr val="accent1"/>
+          </a:fillRef>
+          <a:effectRef idx="0">
+            <a:schemeClr val="accent1"/>
+          </a:effectRef>
+          <a:fontRef idx="minor">
+            <a:schemeClr val="lt1"/>
+          </a:fontRef>
+        </p:style>
+        <p:txBody>
+          <a:bodyPr rtlCol="0" anchor="ctr"/>
+          <a:lstStyle/>
+          <a:p>
+            <a:pPr algn="ctr"/>
+            <a:endParaRPr lang="es-ES"/>
+          </a:p>
+        </p:txBody>
+      </p:sp>
+      <p:sp>
+        <p:nvSpPr>
+          <p:cNvPr id="13" name="Rectángulo 12"/>
+          <p:cNvSpPr/>
+          <p:nvPr/>
+        </p:nvSpPr>
+        <p:spPr>
+          <a:xfrm>
+            <a:off x="1442866" y="1930991"/>
+            <a:ext cx="1966154" cy="307777"/>
+          </a:xfrm>
+          <a:prstGeom prst="rect">
+            <a:avLst/>
+          </a:prstGeom>
+        </p:spPr>
+        <p:txBody>
+          <a:bodyPr wrap="square">
+            <a:spAutoFit/>
+          </a:bodyPr>
+          <a:lstStyle/>
+          <a:p>
+            <a:r>
+              <a:rPr lang="es-ES" sz="1400" b="1" dirty="0" err="1" smtClean="0">
+                <a:latin typeface="Arial" panose="020B0604020202020204" pitchFamily="34" charset="0"/>
+                <a:cs typeface="Arial" panose="020B0604020202020204" pitchFamily="34" charset="0"/>
+              </a:rPr>
+              <a:t>ConexionSql</a:t>
+            </a:r>
+            <a:endParaRPr lang="es-ES" sz="1200" b="1" dirty="0">
+              <a:latin typeface="Arial" panose="020B0604020202020204" pitchFamily="34" charset="0"/>
+              <a:cs typeface="Arial" panose="020B0604020202020204" pitchFamily="34" charset="0"/>
+            </a:endParaRPr>
           </a:p>
         </p:txBody>
       </p:sp>
@@ -6602,7 +6666,7 @@
         </p:nvSpPr>
         <p:spPr>
           <a:xfrm>
-            <a:off x="157280" y="2337732"/>
+            <a:off x="679540" y="2322892"/>
             <a:ext cx="2951443" cy="584839"/>
           </a:xfrm>
         </p:spPr>
@@ -6620,7 +6684,7 @@
                 <a:latin typeface="Arial" panose="020B0604020202020204" pitchFamily="34" charset="0"/>
                 <a:cs typeface="Arial" panose="020B0604020202020204" pitchFamily="34" charset="0"/>
               </a:rPr>
-              <a:t>- Selecciono El tipo de contrato</a:t>
+              <a:t>- Selecciono el tipo de contrato</a:t>
             </a:r>
             <a:endParaRPr lang="es-ES" sz="1400" b="1" dirty="0">
               <a:latin typeface="Arial" panose="020B0604020202020204" pitchFamily="34" charset="0"/>
@@ -6639,7 +6703,7 @@
         </p:nvSpPr>
         <p:spPr>
           <a:xfrm>
-            <a:off x="610429" y="4931552"/>
+            <a:off x="822961" y="4931552"/>
             <a:ext cx="2382442" cy="1164772"/>
           </a:xfrm>
           <a:prstGeom prst="rect">
@@ -7356,7 +7420,7 @@
         </p:blipFill>
         <p:spPr>
           <a:xfrm>
-            <a:off x="356549" y="2913309"/>
+            <a:off x="679540" y="2913309"/>
             <a:ext cx="2669284" cy="1932714"/>
           </a:xfrm>
           <a:prstGeom prst="rect">
@@ -7398,13 +7462,13 @@
         </p:nvPicPr>
         <p:blipFill rotWithShape="1">
           <a:blip r:embed="rId4"/>
-          <a:srcRect l="36831" t="2535" r="18661" b="78587"/>
+          <a:srcRect l="42612" t="5721" r="27878" b="78708"/>
           <a:stretch/>
         </p:blipFill>
         <p:spPr>
           <a:xfrm>
-            <a:off x="610429" y="1110636"/>
-            <a:ext cx="1988262" cy="1184972"/>
+            <a:off x="918796" y="1325880"/>
+            <a:ext cx="1318261" cy="977348"/>
           </a:xfrm>
           <a:prstGeom prst="rect">
             <a:avLst/>
@@ -8104,7 +8168,7 @@
         </p:nvSpPr>
         <p:spPr>
           <a:xfrm>
-            <a:off x="341785" y="2300283"/>
+            <a:off x="563235" y="2272568"/>
             <a:ext cx="3044053" cy="320355"/>
           </a:xfrm>
         </p:spPr>
@@ -8122,7 +8186,21 @@
                 <a:latin typeface="Arial" panose="020B0604020202020204" pitchFamily="34" charset="0"/>
                 <a:cs typeface="Arial" panose="020B0604020202020204" pitchFamily="34" charset="0"/>
               </a:rPr>
-              <a:t>- Selecciono El tipo de </a:t>
+              <a:t>- Selecciono </a:t>
+            </a:r>
+            <a:r>
+              <a:rPr lang="es-ES" sz="1400" b="1" dirty="0" smtClean="0">
+                <a:latin typeface="Arial" panose="020B0604020202020204" pitchFamily="34" charset="0"/>
+                <a:cs typeface="Arial" panose="020B0604020202020204" pitchFamily="34" charset="0"/>
+              </a:rPr>
+              <a:t>el </a:t>
+            </a:r>
+            <a:r>
+              <a:rPr lang="es-ES" sz="1400" b="1" dirty="0">
+                <a:latin typeface="Arial" panose="020B0604020202020204" pitchFamily="34" charset="0"/>
+                <a:cs typeface="Arial" panose="020B0604020202020204" pitchFamily="34" charset="0"/>
+              </a:rPr>
+              <a:t>tipo de </a:t>
             </a:r>
             <a:r>
               <a:rPr lang="es-ES" sz="1400" b="1" dirty="0" smtClean="0">
@@ -8510,8 +8588,8 @@
         </p:blipFill>
         <p:spPr>
           <a:xfrm>
-            <a:off x="341785" y="2789078"/>
-            <a:ext cx="3421685" cy="2082689"/>
+            <a:off x="566910" y="2884244"/>
+            <a:ext cx="3225447" cy="1963244"/>
           </a:xfrm>
           <a:prstGeom prst="rect">
             <a:avLst/>
@@ -8526,7 +8604,7 @@
         </p:nvSpPr>
         <p:spPr>
           <a:xfrm rot="7356905" flipV="1">
-            <a:off x="2806248" y="2595480"/>
+            <a:off x="3001032" y="2639352"/>
             <a:ext cx="671489" cy="103299"/>
           </a:xfrm>
           <a:prstGeom prst="rightArrow">
@@ -8576,13 +8654,13 @@
         </p:nvPicPr>
         <p:blipFill rotWithShape="1">
           <a:blip r:embed="rId3"/>
-          <a:srcRect l="36831" t="2535" r="18661" b="78587"/>
+          <a:srcRect l="42375" t="4813" r="27466" b="78587"/>
           <a:stretch/>
         </p:blipFill>
         <p:spPr>
           <a:xfrm>
-            <a:off x="610428" y="1366062"/>
-            <a:ext cx="2440269" cy="929545"/>
+            <a:off x="914401" y="1478280"/>
+            <a:ext cx="1653540" cy="817327"/>
           </a:xfrm>
           <a:prstGeom prst="rect">
             <a:avLst/>
@@ -10675,12 +10753,8 @@
               <a:t>como el nombre, apellidos, </a:t>
             </a:r>
             <a:r>
-              <a:rPr lang="es-ES" sz="1200" b="1" dirty="0" err="1" smtClean="0"/>
-              <a:t>dni</a:t>
-            </a:r>
-            <a:r>
               <a:rPr lang="es-ES" sz="1200" b="1" dirty="0" smtClean="0"/>
-              <a:t>, </a:t>
+              <a:t>DNI, </a:t>
             </a:r>
             <a:r>
               <a:rPr lang="es-ES" sz="1200" b="1" dirty="0"/>
@@ -11440,21 +11514,7 @@
                 <a:latin typeface="Arial" panose="020B0604020202020204" pitchFamily="34" charset="0"/>
                 <a:cs typeface="Arial" panose="020B0604020202020204" pitchFamily="34" charset="0"/>
               </a:rPr>
-              <a:t>Necesitaremos el drive de la conexión en el cual buscamos en </a:t>
-            </a:r>
-            <a:r>
-              <a:rPr lang="es-ES" sz="1400" b="1" dirty="0" err="1" smtClean="0">
-                <a:latin typeface="Arial" panose="020B0604020202020204" pitchFamily="34" charset="0"/>
-                <a:cs typeface="Arial" panose="020B0604020202020204" pitchFamily="34" charset="0"/>
-              </a:rPr>
-              <a:t>intenet</a:t>
-            </a:r>
-            <a:r>
-              <a:rPr lang="es-ES" sz="1400" b="1" dirty="0" smtClean="0">
-                <a:latin typeface="Arial" panose="020B0604020202020204" pitchFamily="34" charset="0"/>
-                <a:cs typeface="Arial" panose="020B0604020202020204" pitchFamily="34" charset="0"/>
-              </a:rPr>
-              <a:t> </a:t>
+              <a:t>Necesitaremos el drive de la conexión en el cual buscamos en internet </a:t>
             </a:r>
             <a:r>
               <a:rPr lang="es-ES" sz="1400" b="1" dirty="0" err="1" smtClean="0">
@@ -12160,8 +12220,8 @@
         </p:nvSpPr>
         <p:spPr>
           <a:xfrm>
-            <a:off x="500906" y="3327793"/>
-            <a:ext cx="3816550" cy="2677656"/>
+            <a:off x="474062" y="2581989"/>
+            <a:ext cx="3556200" cy="3416320"/>
           </a:xfrm>
           <a:prstGeom prst="rect">
             <a:avLst/>
@@ -12191,22 +12251,78 @@
             </a:r>
             <a:r>
               <a:rPr lang="es-ES" sz="1200" b="1" dirty="0"/>
-              <a:t>. La clase establece una conexión a la base de datos y proporciona métodos para insertar, actualizar y eliminar empleados en la base de datos, así como para recuperar la lista de empleados de la base de datos. La lista de empleados se almacena en un </a:t>
-            </a:r>
-            <a:r>
-              <a:rPr lang="es-ES" sz="1200" b="1" dirty="0" err="1"/>
-              <a:t>ArrayList</a:t>
+              <a:t>. La clase establece una conexión a la base de datos y proporciona métodos para </a:t>
+            </a:r>
+            <a:r>
+              <a:rPr lang="es-ES" sz="1200" b="1" dirty="0" smtClean="0"/>
+              <a:t>insertar utilizo una  función para </a:t>
             </a:r>
             <a:r>
               <a:rPr lang="es-ES" sz="1200" b="1" dirty="0"/>
-              <a:t> de objetos Empleado, que puede ser de dos subtipos: Permanente o Contratado, dependiendo del tipo de contrato del empleado. El código utiliza PreparedStatement para evitar problemas de seguridad con la entrada de datos del usuario en las consultas SQL. También se cierra la conexión de base de datos después de cada operación para evitar fugas de recursos.</a:t>
-            </a:r>
+              <a:t>obtener el id autogenerado en base de datos y se asigna al id del </a:t>
+            </a:r>
+            <a:r>
+              <a:rPr lang="es-ES" sz="1200" b="1" dirty="0" smtClean="0"/>
+              <a:t>empleado, también métodos  </a:t>
+            </a:r>
+            <a:r>
+              <a:rPr lang="es-ES" sz="1200" b="1" dirty="0"/>
+              <a:t>actualizar y eliminar empleados en la base de datos, así como para recuperar la lista de empleados de la base de datos. La lista de empleados se almacena en un ArrayList de objetos Empleado, que puede ser de dos subtipos: Permanente o Contratado, dependiendo del tipo de contrato del empleado. El código utiliza PreparedStatement para evitar problemas de seguridad con la entrada de datos del usuario en las consultas SQL. También se cierra la conexión de base de datos después de cada operación para evitar fugas de recursos.</a:t>
+            </a:r>
+          </a:p>
+        </p:txBody>
+      </p:sp>
+      <p:sp>
+        <p:nvSpPr>
+          <p:cNvPr id="30" name="Flecha derecha 29"/>
+          <p:cNvSpPr/>
+          <p:nvPr/>
+        </p:nvSpPr>
+        <p:spPr>
+          <a:xfrm rot="1363106">
+            <a:off x="7110984" y="2521300"/>
+            <a:ext cx="773744" cy="101020"/>
+          </a:xfrm>
+          <a:prstGeom prst="rightArrow">
+            <a:avLst/>
+          </a:prstGeom>
+          <a:solidFill>
+            <a:srgbClr val="FF0000"/>
+          </a:solidFill>
+          <a:ln>
+            <a:solidFill>
+              <a:srgbClr val="FF0000"/>
+            </a:solidFill>
+          </a:ln>
+        </p:spPr>
+        <p:style>
+          <a:lnRef idx="2">
+            <a:schemeClr val="accent1">
+              <a:shade val="50000"/>
+            </a:schemeClr>
+          </a:lnRef>
+          <a:fillRef idx="1">
+            <a:schemeClr val="accent1"/>
+          </a:fillRef>
+          <a:effectRef idx="0">
+            <a:schemeClr val="accent1"/>
+          </a:effectRef>
+          <a:fontRef idx="minor">
+            <a:schemeClr val="lt1"/>
+          </a:fontRef>
+        </p:style>
+        <p:txBody>
+          <a:bodyPr rtlCol="0" anchor="ctr"/>
+          <a:lstStyle/>
+          <a:p>
+            <a:pPr algn="ctr"/>
+            <a:endParaRPr lang="es-ES"/>
           </a:p>
         </p:txBody>
       </p:sp>
       <p:pic>
         <p:nvPicPr>
-          <p:cNvPr id="22" name="Imagen 21"/>
+          <p:cNvPr id="4" name="Imagen 3"/>
           <p:cNvPicPr>
             <a:picLocks noChangeAspect="1"/>
           </p:cNvPicPr>
@@ -12220,23 +12336,47 @@
         </p:blipFill>
         <p:spPr>
           <a:xfrm>
-            <a:off x="7552694" y="3276931"/>
-            <a:ext cx="3634238" cy="2348396"/>
+            <a:off x="8076689" y="1450583"/>
+            <a:ext cx="3172195" cy="2242457"/>
           </a:xfrm>
           <a:prstGeom prst="rect">
             <a:avLst/>
           </a:prstGeom>
         </p:spPr>
       </p:pic>
-      <p:sp>
-        <p:nvSpPr>
-          <p:cNvPr id="30" name="Flecha derecha 29"/>
+      <p:pic>
+        <p:nvPicPr>
+          <p:cNvPr id="5" name="Imagen 4"/>
+          <p:cNvPicPr>
+            <a:picLocks noChangeAspect="1"/>
+          </p:cNvPicPr>
+          <p:nvPr/>
+        </p:nvPicPr>
+        <p:blipFill>
+          <a:blip r:embed="rId5"/>
+          <a:stretch>
+            <a:fillRect/>
+          </a:stretch>
+        </p:blipFill>
+        <p:spPr>
+          <a:xfrm>
+            <a:off x="6388462" y="3949912"/>
+            <a:ext cx="3644538" cy="1934898"/>
+          </a:xfrm>
+          <a:prstGeom prst="rect">
+            <a:avLst/>
+          </a:prstGeom>
+        </p:spPr>
+      </p:pic>
+      <p:sp>
+        <p:nvSpPr>
+          <p:cNvPr id="19" name="Flecha derecha 18"/>
           <p:cNvSpPr/>
           <p:nvPr/>
         </p:nvSpPr>
         <p:spPr>
-          <a:xfrm rot="1363106">
-            <a:off x="7476744" y="2881739"/>
+          <a:xfrm rot="7289369">
+            <a:off x="10141595" y="4185937"/>
             <a:ext cx="773744" cy="101020"/>
           </a:xfrm>
           <a:prstGeom prst="rightArrow">

</xml_diff>